<commit_message>
added informatica cdi notes
</commit_message>
<xml_diff>
--- a/Snowflake/PPT/14.Zero Copy Cloning.pptx
+++ b/Snowflake/PPT/14.Zero Copy Cloning.pptx
@@ -265,7 +265,7 @@
           <a:p>
             <a:fld id="{AB2FF845-C8D2-4283-9432-B9F609B9952E}" type="datetimeFigureOut">
               <a:rPr lang="en-IN" smtClean="0"/>
-              <a:t>13-08-2022</a:t>
+              <a:t>22-01-2024</a:t>
             </a:fld>
             <a:endParaRPr lang="en-IN"/>
           </a:p>
@@ -465,7 +465,7 @@
           <a:p>
             <a:fld id="{AB2FF845-C8D2-4283-9432-B9F609B9952E}" type="datetimeFigureOut">
               <a:rPr lang="en-IN" smtClean="0"/>
-              <a:t>13-08-2022</a:t>
+              <a:t>22-01-2024</a:t>
             </a:fld>
             <a:endParaRPr lang="en-IN"/>
           </a:p>
@@ -675,7 +675,7 @@
           <a:p>
             <a:fld id="{AB2FF845-C8D2-4283-9432-B9F609B9952E}" type="datetimeFigureOut">
               <a:rPr lang="en-IN" smtClean="0"/>
-              <a:t>13-08-2022</a:t>
+              <a:t>22-01-2024</a:t>
             </a:fld>
             <a:endParaRPr lang="en-IN"/>
           </a:p>
@@ -875,7 +875,7 @@
           <a:p>
             <a:fld id="{AB2FF845-C8D2-4283-9432-B9F609B9952E}" type="datetimeFigureOut">
               <a:rPr lang="en-IN" smtClean="0"/>
-              <a:t>13-08-2022</a:t>
+              <a:t>22-01-2024</a:t>
             </a:fld>
             <a:endParaRPr lang="en-IN"/>
           </a:p>
@@ -1151,7 +1151,7 @@
           <a:p>
             <a:fld id="{AB2FF845-C8D2-4283-9432-B9F609B9952E}" type="datetimeFigureOut">
               <a:rPr lang="en-IN" smtClean="0"/>
-              <a:t>13-08-2022</a:t>
+              <a:t>22-01-2024</a:t>
             </a:fld>
             <a:endParaRPr lang="en-IN"/>
           </a:p>
@@ -1419,7 +1419,7 @@
           <a:p>
             <a:fld id="{AB2FF845-C8D2-4283-9432-B9F609B9952E}" type="datetimeFigureOut">
               <a:rPr lang="en-IN" smtClean="0"/>
-              <a:t>13-08-2022</a:t>
+              <a:t>22-01-2024</a:t>
             </a:fld>
             <a:endParaRPr lang="en-IN"/>
           </a:p>
@@ -1834,7 +1834,7 @@
           <a:p>
             <a:fld id="{AB2FF845-C8D2-4283-9432-B9F609B9952E}" type="datetimeFigureOut">
               <a:rPr lang="en-IN" smtClean="0"/>
-              <a:t>13-08-2022</a:t>
+              <a:t>22-01-2024</a:t>
             </a:fld>
             <a:endParaRPr lang="en-IN"/>
           </a:p>
@@ -1976,7 +1976,7 @@
           <a:p>
             <a:fld id="{AB2FF845-C8D2-4283-9432-B9F609B9952E}" type="datetimeFigureOut">
               <a:rPr lang="en-IN" smtClean="0"/>
-              <a:t>13-08-2022</a:t>
+              <a:t>22-01-2024</a:t>
             </a:fld>
             <a:endParaRPr lang="en-IN"/>
           </a:p>
@@ -2089,7 +2089,7 @@
           <a:p>
             <a:fld id="{AB2FF845-C8D2-4283-9432-B9F609B9952E}" type="datetimeFigureOut">
               <a:rPr lang="en-IN" smtClean="0"/>
-              <a:t>13-08-2022</a:t>
+              <a:t>22-01-2024</a:t>
             </a:fld>
             <a:endParaRPr lang="en-IN"/>
           </a:p>
@@ -2402,7 +2402,7 @@
           <a:p>
             <a:fld id="{AB2FF845-C8D2-4283-9432-B9F609B9952E}" type="datetimeFigureOut">
               <a:rPr lang="en-IN" smtClean="0"/>
-              <a:t>13-08-2022</a:t>
+              <a:t>22-01-2024</a:t>
             </a:fld>
             <a:endParaRPr lang="en-IN"/>
           </a:p>
@@ -2691,7 +2691,7 @@
           <a:p>
             <a:fld id="{AB2FF845-C8D2-4283-9432-B9F609B9952E}" type="datetimeFigureOut">
               <a:rPr lang="en-IN" smtClean="0"/>
-              <a:t>13-08-2022</a:t>
+              <a:t>22-01-2024</a:t>
             </a:fld>
             <a:endParaRPr lang="en-IN"/>
           </a:p>
@@ -2934,7 +2934,7 @@
           <a:p>
             <a:fld id="{AB2FF845-C8D2-4283-9432-B9F609B9952E}" type="datetimeFigureOut">
               <a:rPr lang="en-IN" smtClean="0"/>
-              <a:t>13-08-2022</a:t>
+              <a:t>22-01-2024</a:t>
             </a:fld>
             <a:endParaRPr lang="en-IN"/>
           </a:p>
@@ -3530,7 +3530,7 @@
         </p:spPr>
         <p:txBody>
           <a:bodyPr>
-            <a:normAutofit fontScale="92500"/>
+            <a:normAutofit fontScale="92500" lnSpcReduction="20000"/>
           </a:bodyPr>
           <a:lstStyle/>
           <a:p>
@@ -3607,7 +3607,23 @@
               </a:rPr>
               <a:t>Taking back up of data</a:t>
             </a:r>
-            <a:endParaRPr lang="en-US" sz="2200" dirty="0"/>
+          </a:p>
+          <a:p>
+            <a:pPr marL="457200" lvl="1" indent="0">
+              <a:buNone/>
+            </a:pPr>
+            <a:r>
+              <a:rPr lang="en-US" b="0" i="0" dirty="0">
+                <a:solidFill>
+                  <a:srgbClr val="2D2F31"/>
+                </a:solidFill>
+                <a:latin typeface="ArialMT"/>
+              </a:rPr>
+              <a:t>A clone is an independent object. Therefore if we update the source object this will not be reflected in the clone.</a:t>
+            </a:r>
+            <a:endParaRPr lang="en-US" dirty="0">
+              <a:latin typeface="ArialMT"/>
+            </a:endParaRPr>
           </a:p>
         </p:txBody>
       </p:sp>

</xml_diff>